<commit_message>
Final adjustments after presenting this Friday session
</commit_message>
<xml_diff>
--- a/04-aws-cli/04-aws-cli.pptx
+++ b/04-aws-cli/04-aws-cli.pptx
@@ -204,7 +204,7 @@
           <a:p>
             <a:fld id="{926F5171-4620-824D-BBEE-9B12D10DDA40}" type="datetimeFigureOut">
               <a:rPr lang="en-US" smtClean="0"/>
-              <a:t>6/24/21</a:t>
+              <a:t>7/2/21</a:t>
             </a:fld>
             <a:endParaRPr lang="en-US"/>
           </a:p>
@@ -1314,7 +1314,7 @@
           <a:p>
             <a:fld id="{5940F215-8337-114F-9F3D-71B1107C1CD3}" type="datetimeFigureOut">
               <a:rPr lang="en-US" smtClean="0"/>
-              <a:t>6/24/21</a:t>
+              <a:t>7/2/21</a:t>
             </a:fld>
             <a:endParaRPr lang="en-US"/>
           </a:p>
@@ -1538,7 +1538,7 @@
           <a:p>
             <a:fld id="{5940F215-8337-114F-9F3D-71B1107C1CD3}" type="datetimeFigureOut">
               <a:rPr lang="en-US" smtClean="0"/>
-              <a:t>6/24/21</a:t>
+              <a:t>7/2/21</a:t>
             </a:fld>
             <a:endParaRPr lang="en-US"/>
           </a:p>
@@ -1772,7 +1772,7 @@
           <a:p>
             <a:fld id="{5940F215-8337-114F-9F3D-71B1107C1CD3}" type="datetimeFigureOut">
               <a:rPr lang="en-US" smtClean="0"/>
-              <a:t>6/24/21</a:t>
+              <a:t>7/2/21</a:t>
             </a:fld>
             <a:endParaRPr lang="en-US"/>
           </a:p>
@@ -2166,7 +2166,7 @@
           <a:p>
             <a:fld id="{5940F215-8337-114F-9F3D-71B1107C1CD3}" type="datetimeFigureOut">
               <a:rPr lang="en-US" smtClean="0"/>
-              <a:t>6/24/21</a:t>
+              <a:t>7/2/21</a:t>
             </a:fld>
             <a:endParaRPr lang="en-US"/>
           </a:p>
@@ -2598,7 +2598,7 @@
           <a:p>
             <a:fld id="{5940F215-8337-114F-9F3D-71B1107C1CD3}" type="datetimeFigureOut">
               <a:rPr lang="en-US" smtClean="0"/>
-              <a:t>6/24/21</a:t>
+              <a:t>7/2/21</a:t>
             </a:fld>
             <a:endParaRPr lang="en-US"/>
           </a:p>
@@ -2890,7 +2890,7 @@
           <a:p>
             <a:fld id="{5940F215-8337-114F-9F3D-71B1107C1CD3}" type="datetimeFigureOut">
               <a:rPr lang="en-US" smtClean="0"/>
-              <a:t>6/24/21</a:t>
+              <a:t>7/2/21</a:t>
             </a:fld>
             <a:endParaRPr lang="en-US"/>
           </a:p>
@@ -3329,7 +3329,7 @@
           <a:p>
             <a:fld id="{5940F215-8337-114F-9F3D-71B1107C1CD3}" type="datetimeFigureOut">
               <a:rPr lang="en-US" smtClean="0"/>
-              <a:t>6/24/21</a:t>
+              <a:t>7/2/21</a:t>
             </a:fld>
             <a:endParaRPr lang="en-US"/>
           </a:p>
@@ -3495,7 +3495,7 @@
           <a:p>
             <a:fld id="{5940F215-8337-114F-9F3D-71B1107C1CD3}" type="datetimeFigureOut">
               <a:rPr lang="en-US" smtClean="0"/>
-              <a:t>6/24/21</a:t>
+              <a:t>7/2/21</a:t>
             </a:fld>
             <a:endParaRPr lang="en-US"/>
           </a:p>
@@ -3632,7 +3632,7 @@
           <a:p>
             <a:fld id="{5940F215-8337-114F-9F3D-71B1107C1CD3}" type="datetimeFigureOut">
               <a:rPr lang="en-US" smtClean="0"/>
-              <a:t>6/24/21</a:t>
+              <a:t>7/2/21</a:t>
             </a:fld>
             <a:endParaRPr lang="en-US"/>
           </a:p>
@@ -3969,7 +3969,7 @@
           <a:p>
             <a:fld id="{5940F215-8337-114F-9F3D-71B1107C1CD3}" type="datetimeFigureOut">
               <a:rPr lang="en-US" smtClean="0"/>
-              <a:t>6/24/21</a:t>
+              <a:t>7/2/21</a:t>
             </a:fld>
             <a:endParaRPr lang="en-US"/>
           </a:p>
@@ -4864,8 +4864,8 @@
         </p:nvSpPr>
         <p:spPr>
           <a:xfrm>
-            <a:off x="1248032" y="1175658"/>
-            <a:ext cx="1000898" cy="1851747"/>
+            <a:off x="2640162" y="1175658"/>
+            <a:ext cx="455511" cy="1851747"/>
           </a:xfrm>
           <a:prstGeom prst="downArrow">
             <a:avLst/>
@@ -5128,6 +5128,58 @@
           </a:p>
         </p:txBody>
       </p:sp>
+      <p:sp>
+        <p:nvSpPr>
+          <p:cNvPr id="3" name="Rectangle 2">
+            <a:extLst>
+              <a:ext uri="{FF2B5EF4-FFF2-40B4-BE49-F238E27FC236}">
+                <a16:creationId xmlns:a16="http://schemas.microsoft.com/office/drawing/2014/main" id="{1D29D4F1-4053-4F48-97E8-5C32049EA40F}"/>
+              </a:ext>
+            </a:extLst>
+          </p:cNvPr>
+          <p:cNvSpPr/>
+          <p:nvPr/>
+        </p:nvSpPr>
+        <p:spPr>
+          <a:xfrm>
+            <a:off x="92054" y="3479630"/>
+            <a:ext cx="5455521" cy="757708"/>
+          </a:xfrm>
+          <a:prstGeom prst="rect">
+            <a:avLst/>
+          </a:prstGeom>
+          <a:solidFill>
+            <a:schemeClr val="bg1"/>
+          </a:solidFill>
+          <a:ln>
+            <a:noFill/>
+          </a:ln>
+        </p:spPr>
+        <p:style>
+          <a:lnRef idx="2">
+            <a:schemeClr val="accent1">
+              <a:shade val="50000"/>
+            </a:schemeClr>
+          </a:lnRef>
+          <a:fillRef idx="1">
+            <a:schemeClr val="accent1"/>
+          </a:fillRef>
+          <a:effectRef idx="0">
+            <a:schemeClr val="accent1"/>
+          </a:effectRef>
+          <a:fontRef idx="minor">
+            <a:schemeClr val="lt1"/>
+          </a:fontRef>
+        </p:style>
+        <p:txBody>
+          <a:bodyPr rtlCol="0" anchor="ctr"/>
+          <a:lstStyle/>
+          <a:p>
+            <a:pPr algn="ctr"/>
+            <a:endParaRPr lang="en-US"/>
+          </a:p>
+        </p:txBody>
+      </p:sp>
     </p:spTree>
     <p:extLst>
       <p:ext uri="{BB962C8B-B14F-4D97-AF65-F5344CB8AC3E}">
@@ -5138,6 +5190,271 @@
   <p:clrMapOvr>
     <a:masterClrMapping/>
   </p:clrMapOvr>
+  <p:timing>
+    <p:tnLst>
+      <p:par>
+        <p:cTn id="1" dur="indefinite" restart="never" nodeType="tmRoot">
+          <p:childTnLst>
+            <p:seq concurrent="1" nextAc="seek">
+              <p:cTn id="2" dur="indefinite" nodeType="mainSeq">
+                <p:childTnLst>
+                  <p:par>
+                    <p:cTn id="3" fill="hold">
+                      <p:stCondLst>
+                        <p:cond delay="indefinite"/>
+                      </p:stCondLst>
+                      <p:childTnLst>
+                        <p:par>
+                          <p:cTn id="4" fill="hold">
+                            <p:stCondLst>
+                              <p:cond delay="0"/>
+                            </p:stCondLst>
+                            <p:childTnLst>
+                              <p:par>
+                                <p:cTn id="5" presetID="10" presetClass="entr" presetSubtype="0" fill="hold" grpId="0" nodeType="clickEffect">
+                                  <p:stCondLst>
+                                    <p:cond delay="0"/>
+                                  </p:stCondLst>
+                                  <p:childTnLst>
+                                    <p:set>
+                                      <p:cBhvr>
+                                        <p:cTn id="6" dur="1" fill="hold">
+                                          <p:stCondLst>
+                                            <p:cond delay="0"/>
+                                          </p:stCondLst>
+                                        </p:cTn>
+                                        <p:tgtEl>
+                                          <p:spTgt spid="6"/>
+                                        </p:tgtEl>
+                                        <p:attrNameLst>
+                                          <p:attrName>style.visibility</p:attrName>
+                                        </p:attrNameLst>
+                                      </p:cBhvr>
+                                      <p:to>
+                                        <p:strVal val="visible"/>
+                                      </p:to>
+                                    </p:set>
+                                    <p:animEffect transition="in" filter="fade">
+                                      <p:cBhvr>
+                                        <p:cTn id="7" dur="500"/>
+                                        <p:tgtEl>
+                                          <p:spTgt spid="6"/>
+                                        </p:tgtEl>
+                                      </p:cBhvr>
+                                    </p:animEffect>
+                                  </p:childTnLst>
+                                </p:cTn>
+                              </p:par>
+                              <p:par>
+                                <p:cTn id="8" presetID="10" presetClass="entr" presetSubtype="0" fill="hold" nodeType="withEffect">
+                                  <p:stCondLst>
+                                    <p:cond delay="0"/>
+                                  </p:stCondLst>
+                                  <p:childTnLst>
+                                    <p:set>
+                                      <p:cBhvr>
+                                        <p:cTn id="9" dur="1" fill="hold">
+                                          <p:stCondLst>
+                                            <p:cond delay="0"/>
+                                          </p:stCondLst>
+                                        </p:cTn>
+                                        <p:tgtEl>
+                                          <p:spTgt spid="5"/>
+                                        </p:tgtEl>
+                                        <p:attrNameLst>
+                                          <p:attrName>style.visibility</p:attrName>
+                                        </p:attrNameLst>
+                                      </p:cBhvr>
+                                      <p:to>
+                                        <p:strVal val="visible"/>
+                                      </p:to>
+                                    </p:set>
+                                    <p:animEffect transition="in" filter="fade">
+                                      <p:cBhvr>
+                                        <p:cTn id="10" dur="500"/>
+                                        <p:tgtEl>
+                                          <p:spTgt spid="5"/>
+                                        </p:tgtEl>
+                                      </p:cBhvr>
+                                    </p:animEffect>
+                                  </p:childTnLst>
+                                </p:cTn>
+                              </p:par>
+                            </p:childTnLst>
+                          </p:cTn>
+                        </p:par>
+                      </p:childTnLst>
+                    </p:cTn>
+                  </p:par>
+                  <p:par>
+                    <p:cTn id="11" fill="hold">
+                      <p:stCondLst>
+                        <p:cond delay="indefinite"/>
+                      </p:stCondLst>
+                      <p:childTnLst>
+                        <p:par>
+                          <p:cTn id="12" fill="hold">
+                            <p:stCondLst>
+                              <p:cond delay="0"/>
+                            </p:stCondLst>
+                            <p:childTnLst>
+                              <p:par>
+                                <p:cTn id="13" presetID="10" presetClass="entr" presetSubtype="0" fill="hold" grpId="0" nodeType="clickEffect">
+                                  <p:stCondLst>
+                                    <p:cond delay="0"/>
+                                  </p:stCondLst>
+                                  <p:childTnLst>
+                                    <p:set>
+                                      <p:cBhvr>
+                                        <p:cTn id="14" dur="1" fill="hold">
+                                          <p:stCondLst>
+                                            <p:cond delay="0"/>
+                                          </p:stCondLst>
+                                        </p:cTn>
+                                        <p:tgtEl>
+                                          <p:spTgt spid="9"/>
+                                        </p:tgtEl>
+                                        <p:attrNameLst>
+                                          <p:attrName>style.visibility</p:attrName>
+                                        </p:attrNameLst>
+                                      </p:cBhvr>
+                                      <p:to>
+                                        <p:strVal val="visible"/>
+                                      </p:to>
+                                    </p:set>
+                                    <p:animEffect transition="in" filter="fade">
+                                      <p:cBhvr>
+                                        <p:cTn id="15" dur="500"/>
+                                        <p:tgtEl>
+                                          <p:spTgt spid="9"/>
+                                        </p:tgtEl>
+                                      </p:cBhvr>
+                                    </p:animEffect>
+                                  </p:childTnLst>
+                                </p:cTn>
+                              </p:par>
+                            </p:childTnLst>
+                          </p:cTn>
+                        </p:par>
+                        <p:par>
+                          <p:cTn id="16" fill="hold">
+                            <p:stCondLst>
+                              <p:cond delay="500"/>
+                            </p:stCondLst>
+                            <p:childTnLst>
+                              <p:par>
+                                <p:cTn id="17" presetID="22" presetClass="entr" presetSubtype="2" fill="hold" grpId="0" nodeType="afterEffect">
+                                  <p:stCondLst>
+                                    <p:cond delay="0"/>
+                                  </p:stCondLst>
+                                  <p:childTnLst>
+                                    <p:set>
+                                      <p:cBhvr>
+                                        <p:cTn id="18" dur="1" fill="hold">
+                                          <p:stCondLst>
+                                            <p:cond delay="0"/>
+                                          </p:stCondLst>
+                                        </p:cTn>
+                                        <p:tgtEl>
+                                          <p:spTgt spid="13"/>
+                                        </p:tgtEl>
+                                        <p:attrNameLst>
+                                          <p:attrName>style.visibility</p:attrName>
+                                        </p:attrNameLst>
+                                      </p:cBhvr>
+                                      <p:to>
+                                        <p:strVal val="visible"/>
+                                      </p:to>
+                                    </p:set>
+                                    <p:animEffect transition="in" filter="wipe(right)">
+                                      <p:cBhvr>
+                                        <p:cTn id="19" dur="500"/>
+                                        <p:tgtEl>
+                                          <p:spTgt spid="13"/>
+                                        </p:tgtEl>
+                                      </p:cBhvr>
+                                    </p:animEffect>
+                                  </p:childTnLst>
+                                </p:cTn>
+                              </p:par>
+                            </p:childTnLst>
+                          </p:cTn>
+                        </p:par>
+                        <p:par>
+                          <p:cTn id="20" fill="hold">
+                            <p:stCondLst>
+                              <p:cond delay="1000"/>
+                            </p:stCondLst>
+                            <p:childTnLst>
+                              <p:par>
+                                <p:cTn id="21" presetID="10" presetClass="exit" presetSubtype="0" fill="hold" grpId="0" nodeType="afterEffect">
+                                  <p:stCondLst>
+                                    <p:cond delay="0"/>
+                                  </p:stCondLst>
+                                  <p:childTnLst>
+                                    <p:animEffect transition="out" filter="fade">
+                                      <p:cBhvr>
+                                        <p:cTn id="22" dur="500"/>
+                                        <p:tgtEl>
+                                          <p:spTgt spid="3"/>
+                                        </p:tgtEl>
+                                      </p:cBhvr>
+                                    </p:animEffect>
+                                    <p:set>
+                                      <p:cBhvr>
+                                        <p:cTn id="23" dur="1" fill="hold">
+                                          <p:stCondLst>
+                                            <p:cond delay="499"/>
+                                          </p:stCondLst>
+                                        </p:cTn>
+                                        <p:tgtEl>
+                                          <p:spTgt spid="3"/>
+                                        </p:tgtEl>
+                                        <p:attrNameLst>
+                                          <p:attrName>style.visibility</p:attrName>
+                                        </p:attrNameLst>
+                                      </p:cBhvr>
+                                      <p:to>
+                                        <p:strVal val="hidden"/>
+                                      </p:to>
+                                    </p:set>
+                                  </p:childTnLst>
+                                </p:cTn>
+                              </p:par>
+                            </p:childTnLst>
+                          </p:cTn>
+                        </p:par>
+                      </p:childTnLst>
+                    </p:cTn>
+                  </p:par>
+                </p:childTnLst>
+              </p:cTn>
+              <p:prevCondLst>
+                <p:cond evt="onPrev" delay="0">
+                  <p:tgtEl>
+                    <p:sldTgt/>
+                  </p:tgtEl>
+                </p:cond>
+              </p:prevCondLst>
+              <p:nextCondLst>
+                <p:cond evt="onNext" delay="0">
+                  <p:tgtEl>
+                    <p:sldTgt/>
+                  </p:tgtEl>
+                </p:cond>
+              </p:nextCondLst>
+            </p:seq>
+          </p:childTnLst>
+        </p:cTn>
+      </p:par>
+    </p:tnLst>
+    <p:bldLst>
+      <p:bldP spid="6" grpId="0" animBg="1"/>
+      <p:bldP spid="9" grpId="0" animBg="1"/>
+      <p:bldP spid="13" grpId="0" animBg="1"/>
+      <p:bldP spid="3" grpId="0" animBg="1"/>
+    </p:bldLst>
+  </p:timing>
 </p:sld>
 </file>
 
@@ -5239,6 +5556,21 @@
               <a:t>Is “partly” Infrastructure as Code</a:t>
             </a:r>
           </a:p>
+          <a:p>
+            <a:pPr lvl="1"/>
+            <a:r>
+              <a:rPr lang="en-US" dirty="0"/>
+              <a:t>…but you will likely </a:t>
+            </a:r>
+            <a:r>
+              <a:rPr lang="en-US" u="sng" dirty="0"/>
+              <a:t>not</a:t>
+            </a:r>
+            <a:r>
+              <a:rPr lang="en-US" dirty="0"/>
+              <a:t> build whole your infrastructure using CLI</a:t>
+            </a:r>
+          </a:p>
         </p:txBody>
       </p:sp>
       <p:pic>
@@ -5263,7 +5595,7 @@
         </p:blipFill>
         <p:spPr>
           <a:xfrm>
-            <a:off x="8208070" y="1082755"/>
+            <a:off x="8214420" y="1343105"/>
             <a:ext cx="3684184" cy="1639957"/>
           </a:xfrm>
           <a:prstGeom prst="rect">
@@ -8392,7 +8724,7 @@
                                           </p:stCondLst>
                                         </p:cTn>
                                         <p:tgtEl>
-                                          <p:spTgt spid="38"/>
+                                          <p:spTgt spid="40"/>
                                         </p:tgtEl>
                                         <p:attrNameLst>
                                           <p:attrName>style.visibility</p:attrName>
@@ -8406,7 +8738,77 @@
                                       <p:cBhvr>
                                         <p:cTn id="7" dur="500"/>
                                         <p:tgtEl>
-                                          <p:spTgt spid="38"/>
+                                          <p:spTgt spid="40"/>
+                                        </p:tgtEl>
+                                      </p:cBhvr>
+                                    </p:animEffect>
+                                  </p:childTnLst>
+                                </p:cTn>
+                              </p:par>
+                              <p:par>
+                                <p:cTn id="8" presetID="10" presetClass="entr" presetSubtype="0" fill="hold" nodeType="withEffect">
+                                  <p:stCondLst>
+                                    <p:cond delay="0"/>
+                                  </p:stCondLst>
+                                  <p:childTnLst>
+                                    <p:set>
+                                      <p:cBhvr>
+                                        <p:cTn id="9" dur="1" fill="hold">
+                                          <p:stCondLst>
+                                            <p:cond delay="0"/>
+                                          </p:stCondLst>
+                                        </p:cTn>
+                                        <p:tgtEl>
+                                          <p:spTgt spid="21"/>
+                                        </p:tgtEl>
+                                        <p:attrNameLst>
+                                          <p:attrName>style.visibility</p:attrName>
+                                        </p:attrNameLst>
+                                      </p:cBhvr>
+                                      <p:to>
+                                        <p:strVal val="visible"/>
+                                      </p:to>
+                                    </p:set>
+                                    <p:animEffect transition="in" filter="fade">
+                                      <p:cBhvr>
+                                        <p:cTn id="10" dur="500"/>
+                                        <p:tgtEl>
+                                          <p:spTgt spid="21"/>
+                                        </p:tgtEl>
+                                      </p:cBhvr>
+                                    </p:animEffect>
+                                  </p:childTnLst>
+                                </p:cTn>
+                              </p:par>
+                              <p:par>
+                                <p:cTn id="11" presetID="10" presetClass="entr" presetSubtype="0" fill="hold" grpId="0" nodeType="withEffect">
+                                  <p:stCondLst>
+                                    <p:cond delay="0"/>
+                                  </p:stCondLst>
+                                  <p:childTnLst>
+                                    <p:set>
+                                      <p:cBhvr>
+                                        <p:cTn id="12" dur="1" fill="hold">
+                                          <p:stCondLst>
+                                            <p:cond delay="0"/>
+                                          </p:stCondLst>
+                                        </p:cTn>
+                                        <p:tgtEl>
+                                          <p:spTgt spid="32"/>
+                                        </p:tgtEl>
+                                        <p:attrNameLst>
+                                          <p:attrName>style.visibility</p:attrName>
+                                        </p:attrNameLst>
+                                      </p:cBhvr>
+                                      <p:to>
+                                        <p:strVal val="visible"/>
+                                      </p:to>
+                                    </p:set>
+                                    <p:animEffect transition="in" filter="fade">
+                                      <p:cBhvr>
+                                        <p:cTn id="13" dur="500"/>
+                                        <p:tgtEl>
+                                          <p:spTgt spid="32"/>
                                         </p:tgtEl>
                                       </p:cBhvr>
                                     </p:animEffect>
@@ -8420,26 +8822,26 @@
                     </p:cTn>
                   </p:par>
                   <p:par>
-                    <p:cTn id="8" fill="hold">
+                    <p:cTn id="14" fill="hold">
                       <p:stCondLst>
                         <p:cond delay="indefinite"/>
                       </p:stCondLst>
                       <p:childTnLst>
                         <p:par>
-                          <p:cTn id="9" fill="hold">
+                          <p:cTn id="15" fill="hold">
                             <p:stCondLst>
                               <p:cond delay="0"/>
                             </p:stCondLst>
                             <p:childTnLst>
                               <p:par>
-                                <p:cTn id="10" presetID="10" presetClass="entr" presetSubtype="0" fill="hold" grpId="0" nodeType="clickEffect">
+                                <p:cTn id="16" presetID="10" presetClass="entr" presetSubtype="0" fill="hold" grpId="0" nodeType="clickEffect">
                                   <p:stCondLst>
                                     <p:cond delay="0"/>
                                   </p:stCondLst>
                                   <p:childTnLst>
                                     <p:set>
                                       <p:cBhvr>
-                                        <p:cTn id="11" dur="1" fill="hold">
+                                        <p:cTn id="17" dur="1" fill="hold">
                                           <p:stCondLst>
                                             <p:cond delay="0"/>
                                           </p:stCondLst>
@@ -8457,9 +8859,361 @@
                                     </p:set>
                                     <p:animEffect transition="in" filter="fade">
                                       <p:cBhvr>
-                                        <p:cTn id="12" dur="500"/>
+                                        <p:cTn id="18" dur="500"/>
                                         <p:tgtEl>
                                           <p:spTgt spid="39"/>
+                                        </p:tgtEl>
+                                      </p:cBhvr>
+                                    </p:animEffect>
+                                  </p:childTnLst>
+                                </p:cTn>
+                              </p:par>
+                            </p:childTnLst>
+                          </p:cTn>
+                        </p:par>
+                      </p:childTnLst>
+                    </p:cTn>
+                  </p:par>
+                  <p:par>
+                    <p:cTn id="19" fill="hold">
+                      <p:stCondLst>
+                        <p:cond delay="indefinite"/>
+                      </p:stCondLst>
+                      <p:childTnLst>
+                        <p:par>
+                          <p:cTn id="20" fill="hold">
+                            <p:stCondLst>
+                              <p:cond delay="0"/>
+                            </p:stCondLst>
+                            <p:childTnLst>
+                              <p:par>
+                                <p:cTn id="21" presetID="10" presetClass="entr" presetSubtype="0" fill="hold" grpId="0" nodeType="clickEffect">
+                                  <p:stCondLst>
+                                    <p:cond delay="0"/>
+                                  </p:stCondLst>
+                                  <p:childTnLst>
+                                    <p:set>
+                                      <p:cBhvr>
+                                        <p:cTn id="22" dur="1" fill="hold">
+                                          <p:stCondLst>
+                                            <p:cond delay="0"/>
+                                          </p:stCondLst>
+                                        </p:cTn>
+                                        <p:tgtEl>
+                                          <p:spTgt spid="45"/>
+                                        </p:tgtEl>
+                                        <p:attrNameLst>
+                                          <p:attrName>style.visibility</p:attrName>
+                                        </p:attrNameLst>
+                                      </p:cBhvr>
+                                      <p:to>
+                                        <p:strVal val="visible"/>
+                                      </p:to>
+                                    </p:set>
+                                    <p:animEffect transition="in" filter="fade">
+                                      <p:cBhvr>
+                                        <p:cTn id="23" dur="500"/>
+                                        <p:tgtEl>
+                                          <p:spTgt spid="45"/>
+                                        </p:tgtEl>
+                                      </p:cBhvr>
+                                    </p:animEffect>
+                                  </p:childTnLst>
+                                </p:cTn>
+                              </p:par>
+                              <p:par>
+                                <p:cTn id="24" presetID="10" presetClass="entr" presetSubtype="0" fill="hold" nodeType="withEffect">
+                                  <p:stCondLst>
+                                    <p:cond delay="0"/>
+                                  </p:stCondLst>
+                                  <p:childTnLst>
+                                    <p:set>
+                                      <p:cBhvr>
+                                        <p:cTn id="25" dur="1" fill="hold">
+                                          <p:stCondLst>
+                                            <p:cond delay="0"/>
+                                          </p:stCondLst>
+                                        </p:cTn>
+                                        <p:tgtEl>
+                                          <p:spTgt spid="22"/>
+                                        </p:tgtEl>
+                                        <p:attrNameLst>
+                                          <p:attrName>style.visibility</p:attrName>
+                                        </p:attrNameLst>
+                                      </p:cBhvr>
+                                      <p:to>
+                                        <p:strVal val="visible"/>
+                                      </p:to>
+                                    </p:set>
+                                    <p:animEffect transition="in" filter="fade">
+                                      <p:cBhvr>
+                                        <p:cTn id="26" dur="500"/>
+                                        <p:tgtEl>
+                                          <p:spTgt spid="22"/>
+                                        </p:tgtEl>
+                                      </p:cBhvr>
+                                    </p:animEffect>
+                                  </p:childTnLst>
+                                </p:cTn>
+                              </p:par>
+                              <p:par>
+                                <p:cTn id="27" presetID="10" presetClass="entr" presetSubtype="0" fill="hold" grpId="0" nodeType="withEffect">
+                                  <p:stCondLst>
+                                    <p:cond delay="0"/>
+                                  </p:stCondLst>
+                                  <p:childTnLst>
+                                    <p:set>
+                                      <p:cBhvr>
+                                        <p:cTn id="28" dur="1" fill="hold">
+                                          <p:stCondLst>
+                                            <p:cond delay="0"/>
+                                          </p:stCondLst>
+                                        </p:cTn>
+                                        <p:tgtEl>
+                                          <p:spTgt spid="34"/>
+                                        </p:tgtEl>
+                                        <p:attrNameLst>
+                                          <p:attrName>style.visibility</p:attrName>
+                                        </p:attrNameLst>
+                                      </p:cBhvr>
+                                      <p:to>
+                                        <p:strVal val="visible"/>
+                                      </p:to>
+                                    </p:set>
+                                    <p:animEffect transition="in" filter="fade">
+                                      <p:cBhvr>
+                                        <p:cTn id="29" dur="500"/>
+                                        <p:tgtEl>
+                                          <p:spTgt spid="34"/>
+                                        </p:tgtEl>
+                                      </p:cBhvr>
+                                    </p:animEffect>
+                                  </p:childTnLst>
+                                </p:cTn>
+                              </p:par>
+                            </p:childTnLst>
+                          </p:cTn>
+                        </p:par>
+                      </p:childTnLst>
+                    </p:cTn>
+                  </p:par>
+                  <p:par>
+                    <p:cTn id="30" fill="hold">
+                      <p:stCondLst>
+                        <p:cond delay="indefinite"/>
+                      </p:stCondLst>
+                      <p:childTnLst>
+                        <p:par>
+                          <p:cTn id="31" fill="hold">
+                            <p:stCondLst>
+                              <p:cond delay="0"/>
+                            </p:stCondLst>
+                            <p:childTnLst>
+                              <p:par>
+                                <p:cTn id="32" presetID="10" presetClass="entr" presetSubtype="0" fill="hold" grpId="0" nodeType="clickEffect">
+                                  <p:stCondLst>
+                                    <p:cond delay="0"/>
+                                  </p:stCondLst>
+                                  <p:childTnLst>
+                                    <p:set>
+                                      <p:cBhvr>
+                                        <p:cTn id="33" dur="1" fill="hold">
+                                          <p:stCondLst>
+                                            <p:cond delay="0"/>
+                                          </p:stCondLst>
+                                        </p:cTn>
+                                        <p:tgtEl>
+                                          <p:spTgt spid="37"/>
+                                        </p:tgtEl>
+                                        <p:attrNameLst>
+                                          <p:attrName>style.visibility</p:attrName>
+                                        </p:attrNameLst>
+                                      </p:cBhvr>
+                                      <p:to>
+                                        <p:strVal val="visible"/>
+                                      </p:to>
+                                    </p:set>
+                                    <p:animEffect transition="in" filter="fade">
+                                      <p:cBhvr>
+                                        <p:cTn id="34" dur="500"/>
+                                        <p:tgtEl>
+                                          <p:spTgt spid="37"/>
+                                        </p:tgtEl>
+                                      </p:cBhvr>
+                                    </p:animEffect>
+                                  </p:childTnLst>
+                                </p:cTn>
+                              </p:par>
+                              <p:par>
+                                <p:cTn id="35" presetID="10" presetClass="entr" presetSubtype="0" fill="hold" nodeType="withEffect">
+                                  <p:stCondLst>
+                                    <p:cond delay="0"/>
+                                  </p:stCondLst>
+                                  <p:childTnLst>
+                                    <p:set>
+                                      <p:cBhvr>
+                                        <p:cTn id="36" dur="1" fill="hold">
+                                          <p:stCondLst>
+                                            <p:cond delay="0"/>
+                                          </p:stCondLst>
+                                        </p:cTn>
+                                        <p:tgtEl>
+                                          <p:spTgt spid="35"/>
+                                        </p:tgtEl>
+                                        <p:attrNameLst>
+                                          <p:attrName>style.visibility</p:attrName>
+                                        </p:attrNameLst>
+                                      </p:cBhvr>
+                                      <p:to>
+                                        <p:strVal val="visible"/>
+                                      </p:to>
+                                    </p:set>
+                                    <p:animEffect transition="in" filter="fade">
+                                      <p:cBhvr>
+                                        <p:cTn id="37" dur="500"/>
+                                        <p:tgtEl>
+                                          <p:spTgt spid="35"/>
+                                        </p:tgtEl>
+                                      </p:cBhvr>
+                                    </p:animEffect>
+                                  </p:childTnLst>
+                                </p:cTn>
+                              </p:par>
+                              <p:par>
+                                <p:cTn id="38" presetID="10" presetClass="entr" presetSubtype="0" fill="hold" grpId="0" nodeType="withEffect">
+                                  <p:stCondLst>
+                                    <p:cond delay="0"/>
+                                  </p:stCondLst>
+                                  <p:childTnLst>
+                                    <p:set>
+                                      <p:cBhvr>
+                                        <p:cTn id="39" dur="1" fill="hold">
+                                          <p:stCondLst>
+                                            <p:cond delay="0"/>
+                                          </p:stCondLst>
+                                        </p:cTn>
+                                        <p:tgtEl>
+                                          <p:spTgt spid="46"/>
+                                        </p:tgtEl>
+                                        <p:attrNameLst>
+                                          <p:attrName>style.visibility</p:attrName>
+                                        </p:attrNameLst>
+                                      </p:cBhvr>
+                                      <p:to>
+                                        <p:strVal val="visible"/>
+                                      </p:to>
+                                    </p:set>
+                                    <p:animEffect transition="in" filter="fade">
+                                      <p:cBhvr>
+                                        <p:cTn id="40" dur="500"/>
+                                        <p:tgtEl>
+                                          <p:spTgt spid="46"/>
+                                        </p:tgtEl>
+                                      </p:cBhvr>
+                                    </p:animEffect>
+                                  </p:childTnLst>
+                                </p:cTn>
+                              </p:par>
+                            </p:childTnLst>
+                          </p:cTn>
+                        </p:par>
+                      </p:childTnLst>
+                    </p:cTn>
+                  </p:par>
+                  <p:par>
+                    <p:cTn id="41" fill="hold">
+                      <p:stCondLst>
+                        <p:cond delay="indefinite"/>
+                      </p:stCondLst>
+                      <p:childTnLst>
+                        <p:par>
+                          <p:cTn id="42" fill="hold">
+                            <p:stCondLst>
+                              <p:cond delay="0"/>
+                            </p:stCondLst>
+                            <p:childTnLst>
+                              <p:par>
+                                <p:cTn id="43" presetID="10" presetClass="entr" presetSubtype="0" fill="hold" grpId="0" nodeType="clickEffect">
+                                  <p:stCondLst>
+                                    <p:cond delay="0"/>
+                                  </p:stCondLst>
+                                  <p:childTnLst>
+                                    <p:set>
+                                      <p:cBhvr>
+                                        <p:cTn id="44" dur="1" fill="hold">
+                                          <p:stCondLst>
+                                            <p:cond delay="0"/>
+                                          </p:stCondLst>
+                                        </p:cTn>
+                                        <p:tgtEl>
+                                          <p:spTgt spid="38"/>
+                                        </p:tgtEl>
+                                        <p:attrNameLst>
+                                          <p:attrName>style.visibility</p:attrName>
+                                        </p:attrNameLst>
+                                      </p:cBhvr>
+                                      <p:to>
+                                        <p:strVal val="visible"/>
+                                      </p:to>
+                                    </p:set>
+                                    <p:animEffect transition="in" filter="fade">
+                                      <p:cBhvr>
+                                        <p:cTn id="45" dur="500"/>
+                                        <p:tgtEl>
+                                          <p:spTgt spid="38"/>
+                                        </p:tgtEl>
+                                      </p:cBhvr>
+                                    </p:animEffect>
+                                  </p:childTnLst>
+                                </p:cTn>
+                              </p:par>
+                            </p:childTnLst>
+                          </p:cTn>
+                        </p:par>
+                      </p:childTnLst>
+                    </p:cTn>
+                  </p:par>
+                  <p:par>
+                    <p:cTn id="46" fill="hold">
+                      <p:stCondLst>
+                        <p:cond delay="indefinite"/>
+                      </p:stCondLst>
+                      <p:childTnLst>
+                        <p:par>
+                          <p:cTn id="47" fill="hold">
+                            <p:stCondLst>
+                              <p:cond delay="0"/>
+                            </p:stCondLst>
+                            <p:childTnLst>
+                              <p:par>
+                                <p:cTn id="48" presetID="10" presetClass="entr" presetSubtype="0" fill="hold" grpId="0" nodeType="clickEffect">
+                                  <p:stCondLst>
+                                    <p:cond delay="0"/>
+                                  </p:stCondLst>
+                                  <p:childTnLst>
+                                    <p:set>
+                                      <p:cBhvr>
+                                        <p:cTn id="49" dur="1" fill="hold">
+                                          <p:stCondLst>
+                                            <p:cond delay="0"/>
+                                          </p:stCondLst>
+                                        </p:cTn>
+                                        <p:tgtEl>
+                                          <p:spTgt spid="33"/>
+                                        </p:tgtEl>
+                                        <p:attrNameLst>
+                                          <p:attrName>style.visibility</p:attrName>
+                                        </p:attrNameLst>
+                                      </p:cBhvr>
+                                      <p:to>
+                                        <p:strVal val="visible"/>
+                                      </p:to>
+                                    </p:set>
+                                    <p:animEffect transition="in" filter="fade">
+                                      <p:cBhvr>
+                                        <p:cTn id="50" dur="500"/>
+                                        <p:tgtEl>
+                                          <p:spTgt spid="33"/>
                                         </p:tgtEl>
                                       </p:cBhvr>
                                     </p:animEffect>
@@ -8494,8 +9248,15 @@
       </p:par>
     </p:tnLst>
     <p:bldLst>
+      <p:bldP spid="32" grpId="0" animBg="1"/>
+      <p:bldP spid="33" grpId="0" animBg="1"/>
+      <p:bldP spid="34" grpId="0" animBg="1"/>
+      <p:bldP spid="37" grpId="0" animBg="1"/>
       <p:bldP spid="38" grpId="0" animBg="1"/>
       <p:bldP spid="39" grpId="0" animBg="1"/>
+      <p:bldP spid="40" grpId="0" animBg="1"/>
+      <p:bldP spid="45" grpId="0" animBg="1"/>
+      <p:bldP spid="46" grpId="0" animBg="1"/>
     </p:bldLst>
   </p:timing>
 </p:sld>
@@ -8720,7 +9481,7 @@
         <p:spPr>
           <a:xfrm>
             <a:off x="1573253" y="1729863"/>
-            <a:ext cx="9045490" cy="4401205"/>
+            <a:ext cx="9045490" cy="3970318"/>
           </a:xfrm>
           <a:prstGeom prst="rect">
             <a:avLst/>
@@ -8880,34 +9641,6 @@
                 <a:latin typeface="Gotham Medium" panose="02000604030000020004" pitchFamily="2" charset="0"/>
               </a:rPr>
               <a:t>Target Secrets Manager using CLI</a:t>
-            </a:r>
-          </a:p>
-          <a:p>
-            <a:pPr marL="457200" marR="0" lvl="0" indent="-457200" algn="l" defTabSz="914400" rtl="0" eaLnBrk="1" fontAlgn="auto" latinLnBrk="0" hangingPunct="1">
-              <a:lnSpc>
-                <a:spcPct val="100000"/>
-              </a:lnSpc>
-              <a:spcBef>
-                <a:spcPts val="0"/>
-              </a:spcBef>
-              <a:spcAft>
-                <a:spcPts val="0"/>
-              </a:spcAft>
-              <a:buClrTx/>
-              <a:buSzTx/>
-              <a:buFont typeface="Arial" panose="020B0604020202020204" pitchFamily="34" charset="0"/>
-              <a:buChar char="•"/>
-              <a:tabLst/>
-              <a:defRPr/>
-            </a:pPr>
-            <a:r>
-              <a:rPr lang="en-US" sz="2800" dirty="0">
-                <a:solidFill>
-                  <a:srgbClr val="002060"/>
-                </a:solidFill>
-                <a:latin typeface="Gotham Medium" panose="02000604030000020004" pitchFamily="2" charset="0"/>
-              </a:rPr>
-              <a:t>AWS_PROFILE</a:t>
             </a:r>
           </a:p>
           <a:p>
@@ -10667,7 +11400,15 @@
           <a:p>
             <a:r>
               <a:rPr lang="en-US" dirty="0"/>
-              <a:t>What credential is being used…?</a:t>
+              <a:t>What </a:t>
+            </a:r>
+            <a:r>
+              <a:rPr lang="en-US"/>
+              <a:t>credentials are </a:t>
+            </a:r>
+            <a:r>
+              <a:rPr lang="en-US" dirty="0"/>
+              <a:t>being used…?</a:t>
             </a:r>
           </a:p>
         </p:txBody>

</xml_diff>